<commit_message>
Apply fixes based on feedback
</commit_message>
<xml_diff>
--- a/docs/media/Fallback-cheat-sheet.pptx
+++ b/docs/media/Fallback-cheat-sheet.pptx
@@ -2124,7 +2124,7 @@
           </a:ln>
           <a:extLst>
             <a:ext uri="{C572A759-6A51-4108-AA02-DFA0A04FC94B}">
-              <ma14:wrappingTextBoxFlag xmlns="" xmlns:m="http://schemas.openxmlformats.org/officeDocument/2006/math" xmlns:a14="http://schemas.microsoft.com/office/drawing/2010/main" xmlns:ma14="http://schemas.microsoft.com/office/mac/drawingml/2011/main" val="1"/>
+              <ma14:wrappingTextBoxFlag xmlns:ma14="http://schemas.microsoft.com/office/mac/drawingml/2011/main" xmlns:a14="http://schemas.microsoft.com/office/drawing/2010/main" xmlns:m="http://schemas.openxmlformats.org/officeDocument/2006/math" xmlns="" val="1"/>
             </a:ext>
           </a:extLst>
         </p:spPr>
@@ -2163,7 +2163,7 @@
           </a:ln>
           <a:extLst>
             <a:ext uri="{C572A759-6A51-4108-AA02-DFA0A04FC94B}">
-              <ma14:wrappingTextBoxFlag xmlns="" xmlns:m="http://schemas.openxmlformats.org/officeDocument/2006/math" xmlns:a14="http://schemas.microsoft.com/office/drawing/2010/main" xmlns:ma14="http://schemas.microsoft.com/office/mac/drawingml/2011/main" val="1"/>
+              <ma14:wrappingTextBoxFlag xmlns:ma14="http://schemas.microsoft.com/office/mac/drawingml/2011/main" xmlns:a14="http://schemas.microsoft.com/office/drawing/2010/main" xmlns:m="http://schemas.openxmlformats.org/officeDocument/2006/math" xmlns="" val="1"/>
             </a:ext>
           </a:extLst>
         </p:spPr>
@@ -3195,7 +3195,7 @@
                 <a:latin typeface="Source Sans Pro" panose="020B0503030403020204" pitchFamily="34" charset="0"/>
                 <a:ea typeface="Source Sans Pro" panose="020B0503030403020204" pitchFamily="34" charset="0"/>
               </a:rPr>
-              <a:t>if the execution fail.</a:t>
+              <a:t>if the execution fails.</a:t>
             </a:r>
           </a:p>
           <a:p>
@@ -3260,7 +3260,7 @@
           </a:ln>
           <a:extLst>
             <a:ext uri="{C572A759-6A51-4108-AA02-DFA0A04FC94B}">
-              <ma14:wrappingTextBoxFlag xmlns="" xmlns:m="http://schemas.openxmlformats.org/officeDocument/2006/math" xmlns:a14="http://schemas.microsoft.com/office/drawing/2010/main" xmlns:ma14="http://schemas.microsoft.com/office/mac/drawingml/2011/main" val="1"/>
+              <ma14:wrappingTextBoxFlag xmlns:ma14="http://schemas.microsoft.com/office/mac/drawingml/2011/main" xmlns:a14="http://schemas.microsoft.com/office/drawing/2010/main" xmlns:m="http://schemas.openxmlformats.org/officeDocument/2006/math" xmlns="" val="1"/>
             </a:ext>
           </a:extLst>
         </p:spPr>
@@ -3362,7 +3362,7 @@
           </a:ln>
           <a:extLst>
             <a:ext uri="{C572A759-6A51-4108-AA02-DFA0A04FC94B}">
-              <ma14:wrappingTextBoxFlag xmlns="" xmlns:m="http://schemas.openxmlformats.org/officeDocument/2006/math" xmlns:a14="http://schemas.microsoft.com/office/drawing/2010/main" xmlns:ma14="http://schemas.microsoft.com/office/mac/drawingml/2011/main" val="1"/>
+              <ma14:wrappingTextBoxFlag xmlns:ma14="http://schemas.microsoft.com/office/mac/drawingml/2011/main" xmlns:a14="http://schemas.microsoft.com/office/drawing/2010/main" xmlns:m="http://schemas.openxmlformats.org/officeDocument/2006/math" xmlns="" val="1"/>
             </a:ext>
           </a:extLst>
         </p:spPr>
@@ -3407,7 +3407,7 @@
           </a:ln>
           <a:extLst>
             <a:ext uri="{C572A759-6A51-4108-AA02-DFA0A04FC94B}">
-              <ma14:wrappingTextBoxFlag xmlns="" xmlns:m="http://schemas.openxmlformats.org/officeDocument/2006/math" xmlns:a14="http://schemas.microsoft.com/office/drawing/2010/main" xmlns:ma14="http://schemas.microsoft.com/office/mac/drawingml/2011/main" val="1"/>
+              <ma14:wrappingTextBoxFlag xmlns:ma14="http://schemas.microsoft.com/office/mac/drawingml/2011/main" xmlns:a14="http://schemas.microsoft.com/office/drawing/2010/main" xmlns:m="http://schemas.openxmlformats.org/officeDocument/2006/math" xmlns="" val="1"/>
             </a:ext>
           </a:extLst>
         </p:spPr>
@@ -3452,7 +3452,7 @@
           </a:ln>
           <a:extLst>
             <a:ext uri="{C572A759-6A51-4108-AA02-DFA0A04FC94B}">
-              <ma14:wrappingTextBoxFlag xmlns="" xmlns:m="http://schemas.openxmlformats.org/officeDocument/2006/math" xmlns:a14="http://schemas.microsoft.com/office/drawing/2010/main" xmlns:ma14="http://schemas.microsoft.com/office/mac/drawingml/2011/main" val="1"/>
+              <ma14:wrappingTextBoxFlag xmlns:ma14="http://schemas.microsoft.com/office/mac/drawingml/2011/main" xmlns:a14="http://schemas.microsoft.com/office/drawing/2010/main" xmlns:m="http://schemas.openxmlformats.org/officeDocument/2006/math" xmlns="" val="1"/>
             </a:ext>
           </a:extLst>
         </p:spPr>
@@ -3520,7 +3520,7 @@
           </a:ln>
           <a:extLst>
             <a:ext uri="{C572A759-6A51-4108-AA02-DFA0A04FC94B}">
-              <ma14:wrappingTextBoxFlag xmlns="" xmlns:m="http://schemas.openxmlformats.org/officeDocument/2006/math" xmlns:a14="http://schemas.microsoft.com/office/drawing/2010/main" xmlns:ma14="http://schemas.microsoft.com/office/mac/drawingml/2011/main" val="1"/>
+              <ma14:wrappingTextBoxFlag xmlns:ma14="http://schemas.microsoft.com/office/mac/drawingml/2011/main" xmlns:a14="http://schemas.microsoft.com/office/drawing/2010/main" xmlns:m="http://schemas.openxmlformats.org/officeDocument/2006/math" xmlns="" val="1"/>
             </a:ext>
           </a:extLst>
         </p:spPr>
@@ -3588,7 +3588,7 @@
           </a:ln>
           <a:extLst>
             <a:ext uri="{C572A759-6A51-4108-AA02-DFA0A04FC94B}">
-              <ma14:wrappingTextBoxFlag xmlns="" xmlns:m="http://schemas.openxmlformats.org/officeDocument/2006/math" xmlns:a14="http://schemas.microsoft.com/office/drawing/2010/main" xmlns:ma14="http://schemas.microsoft.com/office/mac/drawingml/2011/main" val="1"/>
+              <ma14:wrappingTextBoxFlag xmlns:ma14="http://schemas.microsoft.com/office/mac/drawingml/2011/main" xmlns:a14="http://schemas.microsoft.com/office/drawing/2010/main" xmlns:m="http://schemas.openxmlformats.org/officeDocument/2006/math" xmlns="" val="1"/>
             </a:ext>
           </a:extLst>
         </p:spPr>
@@ -3621,7 +3621,7 @@
                   <a:srgbClr val="628DB5"/>
                 </a:solidFill>
               </a:rPr>
-              <a:t>Specify asynchronously delegate for timeout notification </a:t>
+              <a:t>Specify asynchronous delegate for notification </a:t>
             </a:r>
           </a:p>
           <a:p>
@@ -5161,7 +5161,7 @@
           </a:ln>
           <a:extLst>
             <a:ext uri="{C572A759-6A51-4108-AA02-DFA0A04FC94B}">
-              <ma14:wrappingTextBoxFlag xmlns="" xmlns:m="http://schemas.openxmlformats.org/officeDocument/2006/math" xmlns:a14="http://schemas.microsoft.com/office/drawing/2010/main" xmlns:ma14="http://schemas.microsoft.com/office/mac/drawingml/2011/main" val="1"/>
+              <ma14:wrappingTextBoxFlag xmlns:ma14="http://schemas.microsoft.com/office/mac/drawingml/2011/main" xmlns:a14="http://schemas.microsoft.com/office/drawing/2010/main" xmlns:m="http://schemas.openxmlformats.org/officeDocument/2006/math" xmlns="" val="1"/>
             </a:ext>
           </a:extLst>
         </p:spPr>

</xml_diff>